<commit_message>
Outline of train, generators and model
</commit_message>
<xml_diff>
--- a/3. Predicting Taxi Ride Duration/Slides/3.1.pptx
+++ b/3. Predicting Taxi Ride Duration/Slides/3.1.pptx
@@ -3733,15 +3733,15 @@
             </a:pPr>
             <a:r>
               <a:rPr lang="en-US" dirty="0"/>
-              <a:t>Expected to take about a few days to train on a decent spec </a:t>
+              <a:t>I could pre-process the green taxi file in under an hour on a decent spec </a:t>
             </a:r>
             <a:r>
               <a:rPr lang="en-US" dirty="0" err="1"/>
-              <a:t>Macbook</a:t>
+              <a:t>macbook</a:t>
             </a:r>
             <a:r>
               <a:rPr lang="en-US" dirty="0"/>
-              <a:t> Pro</a:t>
+              <a:t> pro, but I needed a server with 48GB memory and 2 cores to pre-process the yellow taxi file (it’s circa 10x bigger!)</a:t>
             </a:r>
           </a:p>
           <a:p>
@@ -3751,51 +3751,7 @@
               </a:spcBef>
               <a:buNone/>
             </a:pPr>
-            <a:r>
-              <a:rPr lang="en-US" dirty="0"/>
-              <a:t>Took approx. 5 hours on a 2core 13GB VM in Google cloud using a Nvidia K80 GPU</a:t>
-            </a:r>
-          </a:p>
-          <a:p>
-            <a:pPr lvl="0" rtl="0">
-              <a:spcBef>
-                <a:spcPts val="0"/>
-              </a:spcBef>
-              <a:buNone/>
-            </a:pPr>
-            <a:r>
-              <a:rPr lang="en-US" dirty="0"/>
-              <a:t>However, I’ve provided a pre-trained model so you can still work with the code and understand what it is doing</a:t>
-            </a:r>
-          </a:p>
-          <a:p>
-            <a:pPr lvl="0" rtl="0">
-              <a:spcBef>
-                <a:spcPts val="0"/>
-              </a:spcBef>
-              <a:buNone/>
-            </a:pPr>
             <a:endParaRPr lang="en-US" dirty="0"/>
-          </a:p>
-          <a:p>
-            <a:pPr lvl="0" rtl="0">
-              <a:spcBef>
-                <a:spcPts val="0"/>
-              </a:spcBef>
-              <a:buNone/>
-            </a:pPr>
-            <a:r>
-              <a:rPr lang="en-US" dirty="0"/>
-              <a:t>Note that at this point in time, </a:t>
-            </a:r>
-            <a:r>
-              <a:rPr lang="en-US" dirty="0" err="1"/>
-              <a:t>Tensorflow</a:t>
-            </a:r>
-            <a:r>
-              <a:rPr lang="en-US" dirty="0"/>
-              <a:t> wasn’t compatible with Python 3.7. I used Python 3.6 and TF 1.11 here!</a:t>
-            </a:r>
           </a:p>
           <a:p>
             <a:pPr lvl="0" rtl="0">
@@ -9832,7 +9788,7 @@
 </file>
 
 <file path=ppt/slides/slide7.xml><?xml version="1.0" encoding="utf-8"?>
-<p:sld xmlns:a="http://schemas.openxmlformats.org/drawingml/2006/main" xmlns:r="http://schemas.openxmlformats.org/officeDocument/2006/relationships" xmlns:p="http://schemas.openxmlformats.org/presentationml/2006/main" show="0">
+<p:sld xmlns:a="http://schemas.openxmlformats.org/drawingml/2006/main" xmlns:r="http://schemas.openxmlformats.org/officeDocument/2006/relationships" xmlns:p="http://schemas.openxmlformats.org/presentationml/2006/main">
   <p:cSld>
     <p:bg>
       <p:bgPr>
@@ -9903,7 +9859,7 @@
 </file>
 
 <file path=ppt/slides/slide8.xml><?xml version="1.0" encoding="utf-8"?>
-<p:sld xmlns:a="http://schemas.openxmlformats.org/drawingml/2006/main" xmlns:r="http://schemas.openxmlformats.org/officeDocument/2006/relationships" xmlns:p="http://schemas.openxmlformats.org/presentationml/2006/main" show="0">
+<p:sld xmlns:a="http://schemas.openxmlformats.org/drawingml/2006/main" xmlns:r="http://schemas.openxmlformats.org/officeDocument/2006/relationships" xmlns:p="http://schemas.openxmlformats.org/presentationml/2006/main">
   <p:cSld>
     <p:spTree>
       <p:nvGrpSpPr>
@@ -10108,7 +10064,7 @@
 </file>
 
 <file path=ppt/slides/slide9.xml><?xml version="1.0" encoding="utf-8"?>
-<p:sld xmlns:a="http://schemas.openxmlformats.org/drawingml/2006/main" xmlns:r="http://schemas.openxmlformats.org/officeDocument/2006/relationships" xmlns:p="http://schemas.openxmlformats.org/presentationml/2006/main" show="0">
+<p:sld xmlns:a="http://schemas.openxmlformats.org/drawingml/2006/main" xmlns:r="http://schemas.openxmlformats.org/officeDocument/2006/relationships" xmlns:p="http://schemas.openxmlformats.org/presentationml/2006/main">
   <p:cSld>
     <p:spTree>
       <p:nvGrpSpPr>
@@ -10194,23 +10150,23 @@
                   <a:srgbClr val="434343"/>
                 </a:solidFill>
               </a:rPr>
-              <a:t>This model requires a powerful PC, preferably with a GPU, or use of a cloud GPU instance</a:t>
-            </a:r>
-          </a:p>
-          <a:p>
-            <a:pPr marL="914507" indent="-711281">
-              <a:buClr>
-                <a:srgbClr val="434343"/>
-              </a:buClr>
-              <a:buChar char="●"/>
-            </a:pPr>
+              <a:t>This model requires a powerful </a:t>
+            </a:r>
+            <a:r>
+              <a:rPr lang="en-US" sz="4002" dirty="0" err="1">
+                <a:solidFill>
+                  <a:srgbClr val="434343"/>
+                </a:solidFill>
+              </a:rPr>
+              <a:t>PCwith</a:t>
+            </a:r>
             <a:r>
               <a:rPr lang="en-US" sz="4002" dirty="0">
                 <a:solidFill>
                   <a:srgbClr val="434343"/>
                 </a:solidFill>
               </a:rPr>
-              <a:t>It took many hours to train to a level where the predicted angles were accurate enough for demo purposes</a:t>
+              <a:t> a GPU, or use of a cloud GPU instance</a:t>
             </a:r>
           </a:p>
           <a:p>
@@ -10226,20 +10182,68 @@
                   <a:srgbClr val="434343"/>
                 </a:solidFill>
               </a:rPr>
-              <a:t>Please check Python version compatibility with </a:t>
-            </a:r>
-            <a:r>
-              <a:rPr lang="en-US" sz="4002" dirty="0" err="1">
+              <a:t>The dataset is large and required </a:t>
+            </a:r>
+            <a:r>
+              <a:rPr lang="en-US" sz="4002">
                 <a:solidFill>
                   <a:srgbClr val="434343"/>
                 </a:solidFill>
               </a:rPr>
-              <a:t>Tensorflow</a:t>
+              <a:t>~48GB </a:t>
             </a:r>
             <a:r>
               <a:rPr lang="en-US" sz="4002" dirty="0">
                 <a:solidFill>
                   <a:srgbClr val="434343"/>
+                </a:solidFill>
+              </a:rPr>
+              <a:t>of memory to pre-process</a:t>
+            </a:r>
+          </a:p>
+          <a:p>
+            <a:pPr marL="914507" indent="-711281">
+              <a:buClr>
+                <a:srgbClr val="434343"/>
+              </a:buClr>
+              <a:buChar char="●"/>
+            </a:pPr>
+            <a:r>
+              <a:rPr lang="en-US" sz="4002" dirty="0">
+                <a:solidFill>
+                  <a:schemeClr val="tx2"/>
+                </a:solidFill>
+              </a:rPr>
+              <a:t>It took many hours to train to a level where the predicted angles were accurate enough for demo purposes</a:t>
+            </a:r>
+          </a:p>
+          <a:p>
+            <a:pPr marL="914507" indent="-711281">
+              <a:buClr>
+                <a:srgbClr val="434343"/>
+              </a:buClr>
+              <a:buChar char="●"/>
+            </a:pPr>
+            <a:r>
+              <a:rPr lang="en-US" sz="4002" dirty="0">
+                <a:solidFill>
+                  <a:schemeClr val="tx2"/>
+                </a:solidFill>
+              </a:rPr>
+              <a:t>Please check Python version compatibility with </a:t>
+            </a:r>
+            <a:r>
+              <a:rPr lang="en-US" sz="4002" dirty="0" err="1">
+                <a:solidFill>
+                  <a:schemeClr val="tx2"/>
+                </a:solidFill>
+              </a:rPr>
+              <a:t>Tensorflow</a:t>
+            </a:r>
+            <a:r>
+              <a:rPr lang="en-US" sz="4002" dirty="0">
+                <a:solidFill>
+                  <a:schemeClr val="tx2"/>
                 </a:solidFill>
               </a:rPr>
               <a:t>!</a:t>

</xml_diff>

<commit_message>
Tidying up explore data notebooks
</commit_message>
<xml_diff>
--- a/3. Predicting Taxi Ride Duration/Slides/3.1.pptx
+++ b/3. Predicting Taxi Ride Duration/Slides/3.1.pptx
@@ -3741,7 +3741,7 @@
             </a:r>
             <a:r>
               <a:rPr lang="en-US" dirty="0"/>
-              <a:t> pro, but I needed a server with 48GB memory and 2 cores to pre-process the yellow taxi file (it’s circa 10x bigger!)</a:t>
+              <a:t> pro, but I used a server with 48GB memory and 2 cores to pre-process the yellow taxi file (it’s circa 10x bigger!)</a:t>
             </a:r>
           </a:p>
           <a:p>
@@ -5972,7 +5972,7 @@
 </file>
 
 <file path=ppt/slides/slide10.xml><?xml version="1.0" encoding="utf-8"?>
-<p:sld xmlns:a="http://schemas.openxmlformats.org/drawingml/2006/main" xmlns:r="http://schemas.openxmlformats.org/officeDocument/2006/relationships" xmlns:p="http://schemas.openxmlformats.org/presentationml/2006/main" show="0">
+<p:sld xmlns:a="http://schemas.openxmlformats.org/drawingml/2006/main" xmlns:r="http://schemas.openxmlformats.org/officeDocument/2006/relationships" xmlns:p="http://schemas.openxmlformats.org/presentationml/2006/main">
   <p:cSld>
     <p:spTree>
       <p:nvGrpSpPr>
@@ -6058,30 +6058,33 @@
                   <a:srgbClr val="434343"/>
                 </a:solidFill>
               </a:rPr>
-              <a:t>The dataset is available here:</a:t>
-            </a:r>
-          </a:p>
-          <a:p>
-            <a:pPr marL="914507" indent="-711281">
-              <a:buClr>
-                <a:srgbClr val="434343"/>
-              </a:buClr>
-              <a:buChar char="●"/>
-            </a:pPr>
-            <a:endParaRPr lang="en-US" sz="4002" dirty="0">
-              <a:solidFill>
-                <a:srgbClr val="434343"/>
-              </a:solidFill>
-            </a:endParaRPr>
-          </a:p>
-          <a:p>
-            <a:pPr marL="914507" indent="-711281">
-              <a:buClr>
-                <a:srgbClr val="434343"/>
-              </a:buClr>
-              <a:buChar char="●"/>
-            </a:pPr>
-            <a:endParaRPr lang="en-US" sz="4002" dirty="0">
+              <a:t>Working with yellow cab taxis in New York City </a:t>
+            </a:r>
+          </a:p>
+          <a:p>
+            <a:pPr marL="203226" lvl="1">
+              <a:buClr>
+                <a:srgbClr val="434343"/>
+              </a:buClr>
+            </a:pPr>
+            <a:r>
+              <a:rPr lang="en-US" sz="3801" dirty="0">
+                <a:solidFill>
+                  <a:srgbClr val="434343"/>
+                </a:solidFill>
+              </a:rPr>
+              <a:t>	</a:t>
+            </a:r>
+            <a:r>
+              <a:rPr lang="en-US" sz="2400" dirty="0">
+                <a:solidFill>
+                  <a:srgbClr val="434343"/>
+                </a:solidFill>
+                <a:hlinkClick r:id="rId3"/>
+              </a:rPr>
+              <a:t>https://goo.gl/maps/JLf7EkCzGsP2</a:t>
+            </a:r>
+            <a:endParaRPr lang="en-US" sz="2400" dirty="0">
               <a:solidFill>
                 <a:srgbClr val="434343"/>
               </a:solidFill>
@@ -6100,8 +6103,141 @@
                   <a:srgbClr val="434343"/>
                 </a:solidFill>
               </a:rPr>
-              <a:t>You can download it with the following script:</a:t>
-            </a:r>
+              <a:t>A full set of taxi trip data for several years is available here:</a:t>
+            </a:r>
+          </a:p>
+          <a:p>
+            <a:pPr marL="203226">
+              <a:buClr>
+                <a:srgbClr val="434343"/>
+              </a:buClr>
+            </a:pPr>
+            <a:r>
+              <a:rPr lang="en-US" sz="4002" dirty="0">
+                <a:solidFill>
+                  <a:srgbClr val="434343"/>
+                </a:solidFill>
+              </a:rPr>
+              <a:t>	</a:t>
+            </a:r>
+            <a:r>
+              <a:rPr lang="en-US" sz="2400" dirty="0">
+                <a:solidFill>
+                  <a:srgbClr val="434343"/>
+                </a:solidFill>
+                <a:hlinkClick r:id="rId4"/>
+              </a:rPr>
+              <a:t>http://www.nyc.gov/html/tlc/html/about/trip_record_data.shtml</a:t>
+            </a:r>
+            <a:r>
+              <a:rPr lang="en-US" sz="2400" dirty="0">
+                <a:solidFill>
+                  <a:srgbClr val="434343"/>
+                </a:solidFill>
+              </a:rPr>
+              <a:t> </a:t>
+            </a:r>
+            <a:endParaRPr lang="en-US" sz="4002" dirty="0">
+              <a:solidFill>
+                <a:srgbClr val="434343"/>
+              </a:solidFill>
+            </a:endParaRPr>
+          </a:p>
+          <a:p>
+            <a:pPr marL="914507" indent="-711281">
+              <a:buClr>
+                <a:srgbClr val="434343"/>
+              </a:buClr>
+              <a:buChar char="●"/>
+            </a:pPr>
+            <a:r>
+              <a:rPr lang="en-US" sz="4002" dirty="0">
+                <a:solidFill>
+                  <a:srgbClr val="434343"/>
+                </a:solidFill>
+              </a:rPr>
+              <a:t>We will work with June 2018 data for this section</a:t>
+            </a:r>
+          </a:p>
+          <a:p>
+            <a:pPr marL="914507" indent="-711281">
+              <a:buClr>
+                <a:srgbClr val="434343"/>
+              </a:buClr>
+              <a:buChar char="●"/>
+            </a:pPr>
+            <a:r>
+              <a:rPr lang="en-US" sz="4002" dirty="0">
+                <a:solidFill>
+                  <a:srgbClr val="434343"/>
+                </a:solidFill>
+              </a:rPr>
+              <a:t>You can download it with the following script in /data:</a:t>
+            </a:r>
+          </a:p>
+          <a:p>
+            <a:pPr marL="203226">
+              <a:buClr>
+                <a:srgbClr val="434343"/>
+              </a:buClr>
+            </a:pPr>
+            <a:r>
+              <a:rPr lang="en-US" sz="4002" dirty="0">
+                <a:solidFill>
+                  <a:srgbClr val="434343"/>
+                </a:solidFill>
+              </a:rPr>
+              <a:t>	</a:t>
+            </a:r>
+            <a:r>
+              <a:rPr lang="en-US" sz="3600" dirty="0">
+                <a:solidFill>
+                  <a:srgbClr val="434343"/>
+                </a:solidFill>
+                <a:latin typeface="Consolas" panose="020B0609020204030204" pitchFamily="49" charset="0"/>
+                <a:cs typeface="Consolas" panose="020B0609020204030204" pitchFamily="49" charset="0"/>
+              </a:rPr>
+              <a:t>bash </a:t>
+            </a:r>
+            <a:r>
+              <a:rPr lang="en-US" sz="3600" dirty="0" err="1">
+                <a:solidFill>
+                  <a:srgbClr val="434343"/>
+                </a:solidFill>
+                <a:latin typeface="Consolas" panose="020B0609020204030204" pitchFamily="49" charset="0"/>
+                <a:cs typeface="Consolas" panose="020B0609020204030204" pitchFamily="49" charset="0"/>
+              </a:rPr>
+              <a:t>downloads.sh</a:t>
+            </a:r>
+            <a:endParaRPr lang="en-US" sz="3600" dirty="0">
+              <a:solidFill>
+                <a:srgbClr val="434343"/>
+              </a:solidFill>
+              <a:latin typeface="Consolas" panose="020B0609020204030204" pitchFamily="49" charset="0"/>
+              <a:cs typeface="Consolas" panose="020B0609020204030204" pitchFamily="49" charset="0"/>
+            </a:endParaRPr>
+          </a:p>
+          <a:p>
+            <a:pPr marL="203226">
+              <a:buClr>
+                <a:srgbClr val="434343"/>
+              </a:buClr>
+            </a:pPr>
+            <a:r>
+              <a:rPr lang="en-US" sz="3600" dirty="0">
+                <a:solidFill>
+                  <a:srgbClr val="434343"/>
+                </a:solidFill>
+                <a:latin typeface="Consolas" panose="020B0609020204030204" pitchFamily="49" charset="0"/>
+                <a:cs typeface="Consolas" panose="020B0609020204030204" pitchFamily="49" charset="0"/>
+              </a:rPr>
+              <a:t>	</a:t>
+            </a:r>
+            <a:endParaRPr lang="en-US" sz="4002" dirty="0">
+              <a:solidFill>
+                <a:srgbClr val="434343"/>
+              </a:solidFill>
+            </a:endParaRPr>
           </a:p>
           <a:p>
             <a:pPr marL="914507" indent="-711281">
@@ -10182,23 +10318,7 @@
                   <a:srgbClr val="434343"/>
                 </a:solidFill>
               </a:rPr>
-              <a:t>The dataset is large and required </a:t>
-            </a:r>
-            <a:r>
-              <a:rPr lang="en-US" sz="4002">
-                <a:solidFill>
-                  <a:srgbClr val="434343"/>
-                </a:solidFill>
-              </a:rPr>
-              <a:t>~48GB </a:t>
-            </a:r>
-            <a:r>
-              <a:rPr lang="en-US" sz="4002" dirty="0">
-                <a:solidFill>
-                  <a:srgbClr val="434343"/>
-                </a:solidFill>
-              </a:rPr>
-              <a:t>of memory to pre-process</a:t>
+              <a:t>The dataset is large and required ~32GB of memory to pre-process</a:t>
             </a:r>
           </a:p>
           <a:p>

</xml_diff>